<commit_message>
shift to bundles stable
@mrparker909 @huttoncp
This is a major update. Of particular interest is the new template for creating a header image for promo posts (a featured flag)

The key change is shifting to a bundle posting. Please read Allison's post on Bundles to rememer (https://alison.rbind.io/post/2019-02-21-hugo-page-bundles/)
@mrparker909 , the guide to submitting for peer review will need to be tweaked to adjust for this change.
</commit_message>
<xml_diff>
--- a/public/img/featured-flag-template.pptx
+++ b/public/img/featured-flag-template.pptx
@@ -6,6 +6,7 @@
   </p:sldMasterIdLst>
   <p:sldIdLst>
     <p:sldId id="259" r:id="rId5"/>
+    <p:sldId id="261" r:id="rId6"/>
   </p:sldIdLst>
   <p:sldSz cx="7315200" cy="5376863"/>
   <p:notesSz cx="6858000" cy="9144000"/>
@@ -110,6 +111,18 @@
     </p:ext>
   </p:extLst>
 </p:presentation>
+</file>
+
+<file path=ppt/commentAuthors.xml><?xml version="1.0" encoding="utf-8"?>
+<p:cmAuthorLst xmlns:a="http://schemas.openxmlformats.org/drawingml/2006/main" xmlns:r="http://schemas.openxmlformats.org/officeDocument/2006/relationships" xmlns:p="http://schemas.openxmlformats.org/presentationml/2006/main">
+  <p:cmAuthor id="1" name="Andriy Koval" initials="AK" lastIdx="1" clrIdx="0">
+    <p:extLst>
+      <p:ext uri="{19B8F6BF-5375-455C-9EA6-DF929625EA0E}">
+        <p15:presenceInfo xmlns:p15="http://schemas.microsoft.com/office/powerpoint/2012/main" userId="S::an499583@ucf.edu::94b0ee10-df03-4853-b640-080a3ffc2346" providerId="AD"/>
+      </p:ext>
+    </p:extLst>
+  </p:cmAuthor>
+</p:cmAuthorLst>
 </file>
 
 <file path=ppt/slideLayouts/slideLayout1.xml><?xml version="1.0" encoding="utf-8"?>
@@ -3020,7 +3033,10 @@
           <a:lstStyle/>
           <a:p>
             <a:pPr algn="ctr"/>
-            <a:endParaRPr lang="en-US"/>
+            <a:endParaRPr lang="en-US">
+              <a:latin typeface="Arial" panose="020B0604020202020204" pitchFamily="34" charset="0"/>
+              <a:cs typeface="Arial" panose="020B0604020202020204" pitchFamily="34" charset="0"/>
+            </a:endParaRPr>
           </a:p>
         </p:txBody>
       </p:sp>
@@ -3070,6 +3086,8 @@
               <a:solidFill>
                 <a:schemeClr val="accent2"/>
               </a:solidFill>
+              <a:latin typeface="Arial" panose="020B0604020202020204" pitchFamily="34" charset="0"/>
+              <a:cs typeface="Arial" panose="020B0604020202020204" pitchFamily="34" charset="0"/>
             </a:endParaRPr>
           </a:p>
         </p:txBody>
@@ -3089,7 +3107,7 @@
         <p:spPr>
           <a:xfrm>
             <a:off x="613212" y="129557"/>
-            <a:ext cx="1264705" cy="307777"/>
+            <a:ext cx="1348446" cy="307777"/>
           </a:xfrm>
           <a:prstGeom prst="rect">
             <a:avLst/>
@@ -3103,7 +3121,10 @@
           <a:lstStyle/>
           <a:p>
             <a:r>
-              <a:rPr lang="en-US" sz="1400" dirty="0"/>
+              <a:rPr lang="en-US" sz="1400" dirty="0">
+                <a:latin typeface="Arial" panose="020B0604020202020204" pitchFamily="34" charset="0"/>
+                <a:cs typeface="Arial" panose="020B0604020202020204" pitchFamily="34" charset="0"/>
+              </a:rPr>
               <a:t>Inside the post</a:t>
             </a:r>
           </a:p>
@@ -3124,7 +3145,7 @@
         <p:spPr>
           <a:xfrm>
             <a:off x="613212" y="752287"/>
-            <a:ext cx="955839" cy="307777"/>
+            <a:ext cx="1019831" cy="307777"/>
           </a:xfrm>
           <a:prstGeom prst="rect">
             <a:avLst/>
@@ -3138,7 +3159,10 @@
           <a:lstStyle/>
           <a:p>
             <a:r>
-              <a:rPr lang="en-US" sz="1400" dirty="0"/>
+              <a:rPr lang="en-US" sz="1400" dirty="0">
+                <a:latin typeface="Arial" panose="020B0604020202020204" pitchFamily="34" charset="0"/>
+                <a:cs typeface="Arial" panose="020B0604020202020204" pitchFamily="34" charset="0"/>
+              </a:rPr>
               <a:t>Main page</a:t>
             </a:r>
           </a:p>
@@ -3186,7 +3210,10 @@
           <a:lstStyle/>
           <a:p>
             <a:pPr algn="ctr"/>
-            <a:endParaRPr lang="en-US"/>
+            <a:endParaRPr lang="en-US">
+              <a:latin typeface="Arial" panose="020B0604020202020204" pitchFamily="34" charset="0"/>
+              <a:cs typeface="Arial" panose="020B0604020202020204" pitchFamily="34" charset="0"/>
+            </a:endParaRPr>
           </a:p>
         </p:txBody>
       </p:sp>
@@ -3252,7 +3279,10 @@
             <a:lstStyle/>
             <a:p>
               <a:pPr algn="ctr"/>
-              <a:endParaRPr lang="en-US"/>
+              <a:endParaRPr lang="en-US">
+                <a:latin typeface="Arial" panose="020B0604020202020204" pitchFamily="34" charset="0"/>
+                <a:cs typeface="Arial" panose="020B0604020202020204" pitchFamily="34" charset="0"/>
+              </a:endParaRPr>
             </a:p>
           </p:txBody>
         </p:sp>
@@ -3298,7 +3328,10 @@
             <a:lstStyle/>
             <a:p>
               <a:pPr algn="ctr"/>
-              <a:endParaRPr lang="en-US"/>
+              <a:endParaRPr lang="en-US">
+                <a:latin typeface="Arial" panose="020B0604020202020204" pitchFamily="34" charset="0"/>
+                <a:cs typeface="Arial" panose="020B0604020202020204" pitchFamily="34" charset="0"/>
+              </a:endParaRPr>
             </a:p>
           </p:txBody>
         </p:sp>
@@ -3344,7 +3377,10 @@
             <a:lstStyle/>
             <a:p>
               <a:pPr algn="ctr"/>
-              <a:endParaRPr lang="en-US"/>
+              <a:endParaRPr lang="en-US">
+                <a:latin typeface="Arial" panose="020B0604020202020204" pitchFamily="34" charset="0"/>
+                <a:cs typeface="Arial" panose="020B0604020202020204" pitchFamily="34" charset="0"/>
+              </a:endParaRPr>
             </a:p>
           </p:txBody>
         </p:sp>
@@ -3390,7 +3426,10 @@
             <a:lstStyle/>
             <a:p>
               <a:pPr algn="ctr"/>
-              <a:endParaRPr lang="en-US"/>
+              <a:endParaRPr lang="en-US">
+                <a:latin typeface="Arial" panose="020B0604020202020204" pitchFamily="34" charset="0"/>
+                <a:cs typeface="Arial" panose="020B0604020202020204" pitchFamily="34" charset="0"/>
+              </a:endParaRPr>
             </a:p>
           </p:txBody>
         </p:sp>
@@ -3436,7 +3475,10 @@
             <a:lstStyle/>
             <a:p>
               <a:pPr algn="ctr"/>
-              <a:endParaRPr lang="en-US"/>
+              <a:endParaRPr lang="en-US">
+                <a:latin typeface="Arial" panose="020B0604020202020204" pitchFamily="34" charset="0"/>
+                <a:cs typeface="Arial" panose="020B0604020202020204" pitchFamily="34" charset="0"/>
+              </a:endParaRPr>
             </a:p>
           </p:txBody>
         </p:sp>
@@ -3503,7 +3545,10 @@
             <a:lstStyle/>
             <a:p>
               <a:pPr algn="ctr"/>
-              <a:endParaRPr lang="en-US"/>
+              <a:endParaRPr lang="en-US">
+                <a:latin typeface="Arial" panose="020B0604020202020204" pitchFamily="34" charset="0"/>
+                <a:cs typeface="Arial" panose="020B0604020202020204" pitchFamily="34" charset="0"/>
+              </a:endParaRPr>
             </a:p>
           </p:txBody>
         </p:sp>
@@ -3549,7 +3594,10 @@
             <a:lstStyle/>
             <a:p>
               <a:pPr algn="ctr"/>
-              <a:endParaRPr lang="en-US"/>
+              <a:endParaRPr lang="en-US">
+                <a:latin typeface="Arial" panose="020B0604020202020204" pitchFamily="34" charset="0"/>
+                <a:cs typeface="Arial" panose="020B0604020202020204" pitchFamily="34" charset="0"/>
+              </a:endParaRPr>
             </a:p>
           </p:txBody>
         </p:sp>
@@ -3595,7 +3643,10 @@
             <a:lstStyle/>
             <a:p>
               <a:pPr algn="ctr"/>
-              <a:endParaRPr lang="en-US"/>
+              <a:endParaRPr lang="en-US">
+                <a:latin typeface="Arial" panose="020B0604020202020204" pitchFamily="34" charset="0"/>
+                <a:cs typeface="Arial" panose="020B0604020202020204" pitchFamily="34" charset="0"/>
+              </a:endParaRPr>
             </a:p>
           </p:txBody>
         </p:sp>
@@ -3641,7 +3692,10 @@
             <a:lstStyle/>
             <a:p>
               <a:pPr algn="ctr"/>
-              <a:endParaRPr lang="en-US"/>
+              <a:endParaRPr lang="en-US">
+                <a:latin typeface="Arial" panose="020B0604020202020204" pitchFamily="34" charset="0"/>
+                <a:cs typeface="Arial" panose="020B0604020202020204" pitchFamily="34" charset="0"/>
+              </a:endParaRPr>
             </a:p>
           </p:txBody>
         </p:sp>
@@ -3687,7 +3741,10 @@
             <a:lstStyle/>
             <a:p>
               <a:pPr algn="ctr"/>
-              <a:endParaRPr lang="en-US"/>
+              <a:endParaRPr lang="en-US">
+                <a:latin typeface="Arial" panose="020B0604020202020204" pitchFamily="34" charset="0"/>
+                <a:cs typeface="Arial" panose="020B0604020202020204" pitchFamily="34" charset="0"/>
+              </a:endParaRPr>
             </a:p>
           </p:txBody>
         </p:sp>
@@ -3754,7 +3811,10 @@
             <a:lstStyle/>
             <a:p>
               <a:pPr algn="ctr"/>
-              <a:endParaRPr lang="en-US"/>
+              <a:endParaRPr lang="en-US">
+                <a:latin typeface="Arial" panose="020B0604020202020204" pitchFamily="34" charset="0"/>
+                <a:cs typeface="Arial" panose="020B0604020202020204" pitchFamily="34" charset="0"/>
+              </a:endParaRPr>
             </a:p>
           </p:txBody>
         </p:sp>
@@ -3800,7 +3860,10 @@
             <a:lstStyle/>
             <a:p>
               <a:pPr algn="ctr"/>
-              <a:endParaRPr lang="en-US"/>
+              <a:endParaRPr lang="en-US">
+                <a:latin typeface="Arial" panose="020B0604020202020204" pitchFamily="34" charset="0"/>
+                <a:cs typeface="Arial" panose="020B0604020202020204" pitchFamily="34" charset="0"/>
+              </a:endParaRPr>
             </a:p>
           </p:txBody>
         </p:sp>
@@ -3846,7 +3909,10 @@
             <a:lstStyle/>
             <a:p>
               <a:pPr algn="ctr"/>
-              <a:endParaRPr lang="en-US"/>
+              <a:endParaRPr lang="en-US">
+                <a:latin typeface="Arial" panose="020B0604020202020204" pitchFamily="34" charset="0"/>
+                <a:cs typeface="Arial" panose="020B0604020202020204" pitchFamily="34" charset="0"/>
+              </a:endParaRPr>
             </a:p>
           </p:txBody>
         </p:sp>
@@ -3892,7 +3958,10 @@
             <a:lstStyle/>
             <a:p>
               <a:pPr algn="ctr"/>
-              <a:endParaRPr lang="en-US"/>
+              <a:endParaRPr lang="en-US">
+                <a:latin typeface="Arial" panose="020B0604020202020204" pitchFamily="34" charset="0"/>
+                <a:cs typeface="Arial" panose="020B0604020202020204" pitchFamily="34" charset="0"/>
+              </a:endParaRPr>
             </a:p>
           </p:txBody>
         </p:sp>
@@ -3938,7 +4007,10 @@
             <a:lstStyle/>
             <a:p>
               <a:pPr algn="ctr"/>
-              <a:endParaRPr lang="en-US"/>
+              <a:endParaRPr lang="en-US">
+                <a:latin typeface="Arial" panose="020B0604020202020204" pitchFamily="34" charset="0"/>
+                <a:cs typeface="Arial" panose="020B0604020202020204" pitchFamily="34" charset="0"/>
+              </a:endParaRPr>
             </a:p>
           </p:txBody>
         </p:sp>
@@ -4005,7 +4077,10 @@
             <a:lstStyle/>
             <a:p>
               <a:pPr algn="ctr"/>
-              <a:endParaRPr lang="en-US"/>
+              <a:endParaRPr lang="en-US">
+                <a:latin typeface="Arial" panose="020B0604020202020204" pitchFamily="34" charset="0"/>
+                <a:cs typeface="Arial" panose="020B0604020202020204" pitchFamily="34" charset="0"/>
+              </a:endParaRPr>
             </a:p>
           </p:txBody>
         </p:sp>
@@ -4051,7 +4126,10 @@
             <a:lstStyle/>
             <a:p>
               <a:pPr algn="ctr"/>
-              <a:endParaRPr lang="en-US"/>
+              <a:endParaRPr lang="en-US">
+                <a:latin typeface="Arial" panose="020B0604020202020204" pitchFamily="34" charset="0"/>
+                <a:cs typeface="Arial" panose="020B0604020202020204" pitchFamily="34" charset="0"/>
+              </a:endParaRPr>
             </a:p>
           </p:txBody>
         </p:sp>
@@ -4097,7 +4175,10 @@
             <a:lstStyle/>
             <a:p>
               <a:pPr algn="ctr"/>
-              <a:endParaRPr lang="en-US"/>
+              <a:endParaRPr lang="en-US">
+                <a:latin typeface="Arial" panose="020B0604020202020204" pitchFamily="34" charset="0"/>
+                <a:cs typeface="Arial" panose="020B0604020202020204" pitchFamily="34" charset="0"/>
+              </a:endParaRPr>
             </a:p>
           </p:txBody>
         </p:sp>
@@ -4143,7 +4224,10 @@
             <a:lstStyle/>
             <a:p>
               <a:pPr algn="ctr"/>
-              <a:endParaRPr lang="en-US"/>
+              <a:endParaRPr lang="en-US">
+                <a:latin typeface="Arial" panose="020B0604020202020204" pitchFamily="34" charset="0"/>
+                <a:cs typeface="Arial" panose="020B0604020202020204" pitchFamily="34" charset="0"/>
+              </a:endParaRPr>
             </a:p>
           </p:txBody>
         </p:sp>
@@ -4189,7 +4273,10 @@
             <a:lstStyle/>
             <a:p>
               <a:pPr algn="ctr"/>
-              <a:endParaRPr lang="en-US"/>
+              <a:endParaRPr lang="en-US">
+                <a:latin typeface="Arial" panose="020B0604020202020204" pitchFamily="34" charset="0"/>
+                <a:cs typeface="Arial" panose="020B0604020202020204" pitchFamily="34" charset="0"/>
+              </a:endParaRPr>
             </a:p>
           </p:txBody>
         </p:sp>
@@ -4256,7 +4343,10 @@
             <a:lstStyle/>
             <a:p>
               <a:pPr algn="ctr"/>
-              <a:endParaRPr lang="en-US"/>
+              <a:endParaRPr lang="en-US">
+                <a:latin typeface="Arial" panose="020B0604020202020204" pitchFamily="34" charset="0"/>
+                <a:cs typeface="Arial" panose="020B0604020202020204" pitchFamily="34" charset="0"/>
+              </a:endParaRPr>
             </a:p>
           </p:txBody>
         </p:sp>
@@ -4302,7 +4392,10 @@
             <a:lstStyle/>
             <a:p>
               <a:pPr algn="ctr"/>
-              <a:endParaRPr lang="en-US"/>
+              <a:endParaRPr lang="en-US">
+                <a:latin typeface="Arial" panose="020B0604020202020204" pitchFamily="34" charset="0"/>
+                <a:cs typeface="Arial" panose="020B0604020202020204" pitchFamily="34" charset="0"/>
+              </a:endParaRPr>
             </a:p>
           </p:txBody>
         </p:sp>
@@ -4348,7 +4441,10 @@
             <a:lstStyle/>
             <a:p>
               <a:pPr algn="ctr"/>
-              <a:endParaRPr lang="en-US"/>
+              <a:endParaRPr lang="en-US">
+                <a:latin typeface="Arial" panose="020B0604020202020204" pitchFamily="34" charset="0"/>
+                <a:cs typeface="Arial" panose="020B0604020202020204" pitchFamily="34" charset="0"/>
+              </a:endParaRPr>
             </a:p>
           </p:txBody>
         </p:sp>
@@ -4394,7 +4490,10 @@
             <a:lstStyle/>
             <a:p>
               <a:pPr algn="ctr"/>
-              <a:endParaRPr lang="en-US"/>
+              <a:endParaRPr lang="en-US">
+                <a:latin typeface="Arial" panose="020B0604020202020204" pitchFamily="34" charset="0"/>
+                <a:cs typeface="Arial" panose="020B0604020202020204" pitchFamily="34" charset="0"/>
+              </a:endParaRPr>
             </a:p>
           </p:txBody>
         </p:sp>
@@ -4440,7 +4539,10 @@
             <a:lstStyle/>
             <a:p>
               <a:pPr algn="ctr"/>
-              <a:endParaRPr lang="en-US"/>
+              <a:endParaRPr lang="en-US">
+                <a:latin typeface="Arial" panose="020B0604020202020204" pitchFamily="34" charset="0"/>
+                <a:cs typeface="Arial" panose="020B0604020202020204" pitchFamily="34" charset="0"/>
+              </a:endParaRPr>
             </a:p>
           </p:txBody>
         </p:sp>
@@ -4507,7 +4609,10 @@
             <a:lstStyle/>
             <a:p>
               <a:pPr algn="ctr"/>
-              <a:endParaRPr lang="en-US"/>
+              <a:endParaRPr lang="en-US">
+                <a:latin typeface="Arial" panose="020B0604020202020204" pitchFamily="34" charset="0"/>
+                <a:cs typeface="Arial" panose="020B0604020202020204" pitchFamily="34" charset="0"/>
+              </a:endParaRPr>
             </a:p>
           </p:txBody>
         </p:sp>
@@ -4553,7 +4658,10 @@
             <a:lstStyle/>
             <a:p>
               <a:pPr algn="ctr"/>
-              <a:endParaRPr lang="en-US"/>
+              <a:endParaRPr lang="en-US">
+                <a:latin typeface="Arial" panose="020B0604020202020204" pitchFamily="34" charset="0"/>
+                <a:cs typeface="Arial" panose="020B0604020202020204" pitchFamily="34" charset="0"/>
+              </a:endParaRPr>
             </a:p>
           </p:txBody>
         </p:sp>
@@ -4599,7 +4707,10 @@
             <a:lstStyle/>
             <a:p>
               <a:pPr algn="ctr"/>
-              <a:endParaRPr lang="en-US"/>
+              <a:endParaRPr lang="en-US">
+                <a:latin typeface="Arial" panose="020B0604020202020204" pitchFamily="34" charset="0"/>
+                <a:cs typeface="Arial" panose="020B0604020202020204" pitchFamily="34" charset="0"/>
+              </a:endParaRPr>
             </a:p>
           </p:txBody>
         </p:sp>
@@ -4645,7 +4756,10 @@
             <a:lstStyle/>
             <a:p>
               <a:pPr algn="ctr"/>
-              <a:endParaRPr lang="en-US"/>
+              <a:endParaRPr lang="en-US">
+                <a:latin typeface="Arial" panose="020B0604020202020204" pitchFamily="34" charset="0"/>
+                <a:cs typeface="Arial" panose="020B0604020202020204" pitchFamily="34" charset="0"/>
+              </a:endParaRPr>
             </a:p>
           </p:txBody>
         </p:sp>
@@ -4691,7 +4805,10 @@
             <a:lstStyle/>
             <a:p>
               <a:pPr algn="ctr"/>
-              <a:endParaRPr lang="en-US"/>
+              <a:endParaRPr lang="en-US">
+                <a:latin typeface="Arial" panose="020B0604020202020204" pitchFamily="34" charset="0"/>
+                <a:cs typeface="Arial" panose="020B0604020202020204" pitchFamily="34" charset="0"/>
+              </a:endParaRPr>
             </a:p>
           </p:txBody>
         </p:sp>
@@ -4758,7 +4875,10 @@
             <a:lstStyle/>
             <a:p>
               <a:pPr algn="ctr"/>
-              <a:endParaRPr lang="en-US"/>
+              <a:endParaRPr lang="en-US">
+                <a:latin typeface="Arial" panose="020B0604020202020204" pitchFamily="34" charset="0"/>
+                <a:cs typeface="Arial" panose="020B0604020202020204" pitchFamily="34" charset="0"/>
+              </a:endParaRPr>
             </a:p>
           </p:txBody>
         </p:sp>
@@ -4804,7 +4924,10 @@
             <a:lstStyle/>
             <a:p>
               <a:pPr algn="ctr"/>
-              <a:endParaRPr lang="en-US"/>
+              <a:endParaRPr lang="en-US">
+                <a:latin typeface="Arial" panose="020B0604020202020204" pitchFamily="34" charset="0"/>
+                <a:cs typeface="Arial" panose="020B0604020202020204" pitchFamily="34" charset="0"/>
+              </a:endParaRPr>
             </a:p>
           </p:txBody>
         </p:sp>
@@ -4850,7 +4973,10 @@
             <a:lstStyle/>
             <a:p>
               <a:pPr algn="ctr"/>
-              <a:endParaRPr lang="en-US"/>
+              <a:endParaRPr lang="en-US">
+                <a:latin typeface="Arial" panose="020B0604020202020204" pitchFamily="34" charset="0"/>
+                <a:cs typeface="Arial" panose="020B0604020202020204" pitchFamily="34" charset="0"/>
+              </a:endParaRPr>
             </a:p>
           </p:txBody>
         </p:sp>
@@ -4896,7 +5022,10 @@
             <a:lstStyle/>
             <a:p>
               <a:pPr algn="ctr"/>
-              <a:endParaRPr lang="en-US"/>
+              <a:endParaRPr lang="en-US">
+                <a:latin typeface="Arial" panose="020B0604020202020204" pitchFamily="34" charset="0"/>
+                <a:cs typeface="Arial" panose="020B0604020202020204" pitchFamily="34" charset="0"/>
+              </a:endParaRPr>
             </a:p>
           </p:txBody>
         </p:sp>
@@ -4942,7 +5071,10 @@
             <a:lstStyle/>
             <a:p>
               <a:pPr algn="ctr"/>
-              <a:endParaRPr lang="en-US"/>
+              <a:endParaRPr lang="en-US">
+                <a:latin typeface="Arial" panose="020B0604020202020204" pitchFamily="34" charset="0"/>
+                <a:cs typeface="Arial" panose="020B0604020202020204" pitchFamily="34" charset="0"/>
+              </a:endParaRPr>
             </a:p>
           </p:txBody>
         </p:sp>
@@ -5009,7 +5141,10 @@
             <a:lstStyle/>
             <a:p>
               <a:pPr algn="ctr"/>
-              <a:endParaRPr lang="en-US"/>
+              <a:endParaRPr lang="en-US">
+                <a:latin typeface="Arial" panose="020B0604020202020204" pitchFamily="34" charset="0"/>
+                <a:cs typeface="Arial" panose="020B0604020202020204" pitchFamily="34" charset="0"/>
+              </a:endParaRPr>
             </a:p>
           </p:txBody>
         </p:sp>
@@ -5055,7 +5190,10 @@
             <a:lstStyle/>
             <a:p>
               <a:pPr algn="ctr"/>
-              <a:endParaRPr lang="en-US"/>
+              <a:endParaRPr lang="en-US">
+                <a:latin typeface="Arial" panose="020B0604020202020204" pitchFamily="34" charset="0"/>
+                <a:cs typeface="Arial" panose="020B0604020202020204" pitchFamily="34" charset="0"/>
+              </a:endParaRPr>
             </a:p>
           </p:txBody>
         </p:sp>
@@ -5101,7 +5239,10 @@
             <a:lstStyle/>
             <a:p>
               <a:pPr algn="ctr"/>
-              <a:endParaRPr lang="en-US"/>
+              <a:endParaRPr lang="en-US">
+                <a:latin typeface="Arial" panose="020B0604020202020204" pitchFamily="34" charset="0"/>
+                <a:cs typeface="Arial" panose="020B0604020202020204" pitchFamily="34" charset="0"/>
+              </a:endParaRPr>
             </a:p>
           </p:txBody>
         </p:sp>
@@ -5147,7 +5288,10 @@
             <a:lstStyle/>
             <a:p>
               <a:pPr algn="ctr"/>
-              <a:endParaRPr lang="en-US"/>
+              <a:endParaRPr lang="en-US">
+                <a:latin typeface="Arial" panose="020B0604020202020204" pitchFamily="34" charset="0"/>
+                <a:cs typeface="Arial" panose="020B0604020202020204" pitchFamily="34" charset="0"/>
+              </a:endParaRPr>
             </a:p>
           </p:txBody>
         </p:sp>
@@ -5193,7 +5337,10 @@
             <a:lstStyle/>
             <a:p>
               <a:pPr algn="ctr"/>
-              <a:endParaRPr lang="en-US"/>
+              <a:endParaRPr lang="en-US">
+                <a:latin typeface="Arial" panose="020B0604020202020204" pitchFamily="34" charset="0"/>
+                <a:cs typeface="Arial" panose="020B0604020202020204" pitchFamily="34" charset="0"/>
+              </a:endParaRPr>
             </a:p>
           </p:txBody>
         </p:sp>
@@ -5260,7 +5407,10 @@
             <a:lstStyle/>
             <a:p>
               <a:pPr algn="ctr"/>
-              <a:endParaRPr lang="en-US"/>
+              <a:endParaRPr lang="en-US">
+                <a:latin typeface="Arial" panose="020B0604020202020204" pitchFamily="34" charset="0"/>
+                <a:cs typeface="Arial" panose="020B0604020202020204" pitchFamily="34" charset="0"/>
+              </a:endParaRPr>
             </a:p>
           </p:txBody>
         </p:sp>
@@ -5306,7 +5456,10 @@
             <a:lstStyle/>
             <a:p>
               <a:pPr algn="ctr"/>
-              <a:endParaRPr lang="en-US"/>
+              <a:endParaRPr lang="en-US">
+                <a:latin typeface="Arial" panose="020B0604020202020204" pitchFamily="34" charset="0"/>
+                <a:cs typeface="Arial" panose="020B0604020202020204" pitchFamily="34" charset="0"/>
+              </a:endParaRPr>
             </a:p>
           </p:txBody>
         </p:sp>
@@ -5352,7 +5505,10 @@
             <a:lstStyle/>
             <a:p>
               <a:pPr algn="ctr"/>
-              <a:endParaRPr lang="en-US"/>
+              <a:endParaRPr lang="en-US">
+                <a:latin typeface="Arial" panose="020B0604020202020204" pitchFamily="34" charset="0"/>
+                <a:cs typeface="Arial" panose="020B0604020202020204" pitchFamily="34" charset="0"/>
+              </a:endParaRPr>
             </a:p>
           </p:txBody>
         </p:sp>
@@ -5398,7 +5554,10 @@
             <a:lstStyle/>
             <a:p>
               <a:pPr algn="ctr"/>
-              <a:endParaRPr lang="en-US"/>
+              <a:endParaRPr lang="en-US">
+                <a:latin typeface="Arial" panose="020B0604020202020204" pitchFamily="34" charset="0"/>
+                <a:cs typeface="Arial" panose="020B0604020202020204" pitchFamily="34" charset="0"/>
+              </a:endParaRPr>
             </a:p>
           </p:txBody>
         </p:sp>
@@ -5444,7 +5603,10 @@
             <a:lstStyle/>
             <a:p>
               <a:pPr algn="ctr"/>
-              <a:endParaRPr lang="en-US"/>
+              <a:endParaRPr lang="en-US">
+                <a:latin typeface="Arial" panose="020B0604020202020204" pitchFamily="34" charset="0"/>
+                <a:cs typeface="Arial" panose="020B0604020202020204" pitchFamily="34" charset="0"/>
+              </a:endParaRPr>
             </a:p>
           </p:txBody>
         </p:sp>
@@ -5511,7 +5673,10 @@
             <a:lstStyle/>
             <a:p>
               <a:pPr algn="ctr"/>
-              <a:endParaRPr lang="en-US"/>
+              <a:endParaRPr lang="en-US">
+                <a:latin typeface="Arial" panose="020B0604020202020204" pitchFamily="34" charset="0"/>
+                <a:cs typeface="Arial" panose="020B0604020202020204" pitchFamily="34" charset="0"/>
+              </a:endParaRPr>
             </a:p>
           </p:txBody>
         </p:sp>
@@ -5557,7 +5722,10 @@
             <a:lstStyle/>
             <a:p>
               <a:pPr algn="ctr"/>
-              <a:endParaRPr lang="en-US"/>
+              <a:endParaRPr lang="en-US">
+                <a:latin typeface="Arial" panose="020B0604020202020204" pitchFamily="34" charset="0"/>
+                <a:cs typeface="Arial" panose="020B0604020202020204" pitchFamily="34" charset="0"/>
+              </a:endParaRPr>
             </a:p>
           </p:txBody>
         </p:sp>
@@ -5603,7 +5771,10 @@
             <a:lstStyle/>
             <a:p>
               <a:pPr algn="ctr"/>
-              <a:endParaRPr lang="en-US"/>
+              <a:endParaRPr lang="en-US">
+                <a:latin typeface="Arial" panose="020B0604020202020204" pitchFamily="34" charset="0"/>
+                <a:cs typeface="Arial" panose="020B0604020202020204" pitchFamily="34" charset="0"/>
+              </a:endParaRPr>
             </a:p>
           </p:txBody>
         </p:sp>
@@ -5649,7 +5820,10 @@
             <a:lstStyle/>
             <a:p>
               <a:pPr algn="ctr"/>
-              <a:endParaRPr lang="en-US"/>
+              <a:endParaRPr lang="en-US">
+                <a:latin typeface="Arial" panose="020B0604020202020204" pitchFamily="34" charset="0"/>
+                <a:cs typeface="Arial" panose="020B0604020202020204" pitchFamily="34" charset="0"/>
+              </a:endParaRPr>
             </a:p>
           </p:txBody>
         </p:sp>
@@ -5695,7 +5869,10 @@
             <a:lstStyle/>
             <a:p>
               <a:pPr algn="ctr"/>
-              <a:endParaRPr lang="en-US"/>
+              <a:endParaRPr lang="en-US">
+                <a:latin typeface="Arial" panose="020B0604020202020204" pitchFamily="34" charset="0"/>
+                <a:cs typeface="Arial" panose="020B0604020202020204" pitchFamily="34" charset="0"/>
+              </a:endParaRPr>
             </a:p>
           </p:txBody>
         </p:sp>
@@ -5715,7 +5892,7 @@
         <p:spPr>
           <a:xfrm>
             <a:off x="613212" y="1519235"/>
-            <a:ext cx="2616294" cy="307777"/>
+            <a:ext cx="2831224" cy="307777"/>
           </a:xfrm>
           <a:prstGeom prst="rect">
             <a:avLst/>
@@ -5729,7 +5906,10 @@
           <a:lstStyle/>
           <a:p>
             <a:r>
-              <a:rPr lang="en-US" sz="1400" dirty="0"/>
+              <a:rPr lang="en-US" sz="1400" dirty="0">
+                <a:latin typeface="Arial" panose="020B0604020202020204" pitchFamily="34" charset="0"/>
+                <a:cs typeface="Arial" panose="020B0604020202020204" pitchFamily="34" charset="0"/>
+              </a:rPr>
               <a:t>Widest during scaling of the page</a:t>
             </a:r>
           </a:p>
@@ -5797,7 +5977,10 @@
             <a:lstStyle/>
             <a:p>
               <a:pPr algn="ctr"/>
-              <a:endParaRPr lang="en-US"/>
+              <a:endParaRPr lang="en-US">
+                <a:latin typeface="Arial" panose="020B0604020202020204" pitchFamily="34" charset="0"/>
+                <a:cs typeface="Arial" panose="020B0604020202020204" pitchFamily="34" charset="0"/>
+              </a:endParaRPr>
             </a:p>
           </p:txBody>
         </p:sp>
@@ -5843,7 +6026,10 @@
             <a:lstStyle/>
             <a:p>
               <a:pPr algn="ctr"/>
-              <a:endParaRPr lang="en-US"/>
+              <a:endParaRPr lang="en-US">
+                <a:latin typeface="Arial" panose="020B0604020202020204" pitchFamily="34" charset="0"/>
+                <a:cs typeface="Arial" panose="020B0604020202020204" pitchFamily="34" charset="0"/>
+              </a:endParaRPr>
             </a:p>
           </p:txBody>
         </p:sp>
@@ -5889,7 +6075,10 @@
             <a:lstStyle/>
             <a:p>
               <a:pPr algn="ctr"/>
-              <a:endParaRPr lang="en-US"/>
+              <a:endParaRPr lang="en-US">
+                <a:latin typeface="Arial" panose="020B0604020202020204" pitchFamily="34" charset="0"/>
+                <a:cs typeface="Arial" panose="020B0604020202020204" pitchFamily="34" charset="0"/>
+              </a:endParaRPr>
             </a:p>
           </p:txBody>
         </p:sp>
@@ -5935,7 +6124,10 @@
             <a:lstStyle/>
             <a:p>
               <a:pPr algn="ctr"/>
-              <a:endParaRPr lang="en-US"/>
+              <a:endParaRPr lang="en-US">
+                <a:latin typeface="Arial" panose="020B0604020202020204" pitchFamily="34" charset="0"/>
+                <a:cs typeface="Arial" panose="020B0604020202020204" pitchFamily="34" charset="0"/>
+              </a:endParaRPr>
             </a:p>
           </p:txBody>
         </p:sp>
@@ -5981,7 +6173,10 @@
             <a:lstStyle/>
             <a:p>
               <a:pPr algn="ctr"/>
-              <a:endParaRPr lang="en-US"/>
+              <a:endParaRPr lang="en-US">
+                <a:latin typeface="Arial" panose="020B0604020202020204" pitchFamily="34" charset="0"/>
+                <a:cs typeface="Arial" panose="020B0604020202020204" pitchFamily="34" charset="0"/>
+              </a:endParaRPr>
             </a:p>
           </p:txBody>
         </p:sp>
@@ -6048,7 +6243,10 @@
             <a:lstStyle/>
             <a:p>
               <a:pPr algn="ctr"/>
-              <a:endParaRPr lang="en-US"/>
+              <a:endParaRPr lang="en-US">
+                <a:latin typeface="Arial" panose="020B0604020202020204" pitchFamily="34" charset="0"/>
+                <a:cs typeface="Arial" panose="020B0604020202020204" pitchFamily="34" charset="0"/>
+              </a:endParaRPr>
             </a:p>
           </p:txBody>
         </p:sp>
@@ -6094,7 +6292,10 @@
             <a:lstStyle/>
             <a:p>
               <a:pPr algn="ctr"/>
-              <a:endParaRPr lang="en-US"/>
+              <a:endParaRPr lang="en-US">
+                <a:latin typeface="Arial" panose="020B0604020202020204" pitchFamily="34" charset="0"/>
+                <a:cs typeface="Arial" panose="020B0604020202020204" pitchFamily="34" charset="0"/>
+              </a:endParaRPr>
             </a:p>
           </p:txBody>
         </p:sp>
@@ -6140,7 +6341,10 @@
             <a:lstStyle/>
             <a:p>
               <a:pPr algn="ctr"/>
-              <a:endParaRPr lang="en-US"/>
+              <a:endParaRPr lang="en-US">
+                <a:latin typeface="Arial" panose="020B0604020202020204" pitchFamily="34" charset="0"/>
+                <a:cs typeface="Arial" panose="020B0604020202020204" pitchFamily="34" charset="0"/>
+              </a:endParaRPr>
             </a:p>
           </p:txBody>
         </p:sp>
@@ -6186,7 +6390,10 @@
             <a:lstStyle/>
             <a:p>
               <a:pPr algn="ctr"/>
-              <a:endParaRPr lang="en-US"/>
+              <a:endParaRPr lang="en-US">
+                <a:latin typeface="Arial" panose="020B0604020202020204" pitchFamily="34" charset="0"/>
+                <a:cs typeface="Arial" panose="020B0604020202020204" pitchFamily="34" charset="0"/>
+              </a:endParaRPr>
             </a:p>
           </p:txBody>
         </p:sp>
@@ -6232,7 +6439,10 @@
             <a:lstStyle/>
             <a:p>
               <a:pPr algn="ctr"/>
-              <a:endParaRPr lang="en-US"/>
+              <a:endParaRPr lang="en-US">
+                <a:latin typeface="Arial" panose="020B0604020202020204" pitchFamily="34" charset="0"/>
+                <a:cs typeface="Arial" panose="020B0604020202020204" pitchFamily="34" charset="0"/>
+              </a:endParaRPr>
             </a:p>
           </p:txBody>
         </p:sp>
@@ -6251,8 +6461,8 @@
         </p:nvSpPr>
         <p:spPr>
           <a:xfrm>
-            <a:off x="5530641" y="117576"/>
-            <a:ext cx="1260281" cy="307777"/>
+            <a:off x="5378243" y="117576"/>
+            <a:ext cx="1388522" cy="307777"/>
           </a:xfrm>
           <a:prstGeom prst="rect">
             <a:avLst/>
@@ -6266,7 +6476,10 @@
           <a:lstStyle/>
           <a:p>
             <a:r>
-              <a:rPr lang="en-US" sz="1400" dirty="0"/>
+              <a:rPr lang="en-US" sz="1400" dirty="0">
+                <a:latin typeface="Arial" panose="020B0604020202020204" pitchFamily="34" charset="0"/>
+                <a:cs typeface="Arial" panose="020B0604020202020204" pitchFamily="34" charset="0"/>
+              </a:rPr>
               <a:t>8 x 5.88 inches</a:t>
             </a:r>
           </a:p>
@@ -6286,8 +6499,8 @@
         </p:nvSpPr>
         <p:spPr>
           <a:xfrm>
-            <a:off x="5530641" y="752287"/>
-            <a:ext cx="1260281" cy="307777"/>
+            <a:off x="5378243" y="752287"/>
+            <a:ext cx="1388522" cy="307777"/>
           </a:xfrm>
           <a:prstGeom prst="rect">
             <a:avLst/>
@@ -6301,7 +6514,10 @@
           <a:lstStyle/>
           <a:p>
             <a:r>
-              <a:rPr lang="en-US" sz="1400" dirty="0"/>
+              <a:rPr lang="en-US" sz="1400" dirty="0">
+                <a:latin typeface="Arial" panose="020B0604020202020204" pitchFamily="34" charset="0"/>
+                <a:cs typeface="Arial" panose="020B0604020202020204" pitchFamily="34" charset="0"/>
+              </a:rPr>
               <a:t>8 x 4.51 inches</a:t>
             </a:r>
           </a:p>
@@ -6321,8 +6537,8 @@
         </p:nvSpPr>
         <p:spPr>
           <a:xfrm>
-            <a:off x="5530641" y="1530384"/>
-            <a:ext cx="1168910" cy="307777"/>
+            <a:off x="5378243" y="1530384"/>
+            <a:ext cx="1289135" cy="307777"/>
           </a:xfrm>
           <a:prstGeom prst="rect">
             <a:avLst/>
@@ -6336,7 +6552,10 @@
           <a:lstStyle/>
           <a:p>
             <a:r>
-              <a:rPr lang="en-US" sz="1400" dirty="0"/>
+              <a:rPr lang="en-US" sz="1400" dirty="0">
+                <a:latin typeface="Arial" panose="020B0604020202020204" pitchFamily="34" charset="0"/>
+                <a:cs typeface="Arial" panose="020B0604020202020204" pitchFamily="34" charset="0"/>
+              </a:rPr>
               <a:t>8 x 2.8 inches</a:t>
             </a:r>
           </a:p>
@@ -6346,6 +6565,229 @@
     <p:extLst>
       <p:ext uri="{BB962C8B-B14F-4D97-AF65-F5344CB8AC3E}">
         <p14:creationId xmlns:p14="http://schemas.microsoft.com/office/powerpoint/2010/main" val="4173675506"/>
+      </p:ext>
+    </p:extLst>
+  </p:cSld>
+  <p:clrMapOvr>
+    <a:masterClrMapping/>
+  </p:clrMapOvr>
+</p:sld>
+</file>
+
+<file path=ppt/slides/slide2.xml><?xml version="1.0" encoding="utf-8"?>
+<p:sld xmlns:a="http://schemas.openxmlformats.org/drawingml/2006/main" xmlns:r="http://schemas.openxmlformats.org/officeDocument/2006/relationships" xmlns:p="http://schemas.openxmlformats.org/presentationml/2006/main">
+  <p:cSld>
+    <p:spTree>
+      <p:nvGrpSpPr>
+        <p:cNvPr id="1" name=""/>
+        <p:cNvGrpSpPr/>
+        <p:nvPr/>
+      </p:nvGrpSpPr>
+      <p:grpSpPr>
+        <a:xfrm>
+          <a:off x="0" y="0"/>
+          <a:ext cx="0" cy="0"/>
+          <a:chOff x="0" y="0"/>
+          <a:chExt cx="0" cy="0"/>
+        </a:xfrm>
+      </p:grpSpPr>
+      <p:sp>
+        <p:nvSpPr>
+          <p:cNvPr id="4" name="Rectangle 3">
+            <a:extLst>
+              <a:ext uri="{FF2B5EF4-FFF2-40B4-BE49-F238E27FC236}">
+                <a16:creationId xmlns:a16="http://schemas.microsoft.com/office/drawing/2014/main" id="{C7655D2B-19B8-4DFA-9021-B1ECC94B9D22}"/>
+              </a:ext>
+            </a:extLst>
+          </p:cNvPr>
+          <p:cNvSpPr/>
+          <p:nvPr/>
+        </p:nvSpPr>
+        <p:spPr>
+          <a:xfrm>
+            <a:off x="0" y="2237"/>
+            <a:ext cx="7315200" cy="5375871"/>
+          </a:xfrm>
+          <a:prstGeom prst="rect">
+            <a:avLst/>
+          </a:prstGeom>
+          <a:solidFill>
+            <a:schemeClr val="accent4">
+              <a:lumMod val="60000"/>
+              <a:lumOff val="40000"/>
+              <a:alpha val="40000"/>
+            </a:schemeClr>
+          </a:solidFill>
+        </p:spPr>
+        <p:style>
+          <a:lnRef idx="2">
+            <a:schemeClr val="accent1">
+              <a:shade val="50000"/>
+            </a:schemeClr>
+          </a:lnRef>
+          <a:fillRef idx="1">
+            <a:schemeClr val="accent1"/>
+          </a:fillRef>
+          <a:effectRef idx="0">
+            <a:schemeClr val="accent1"/>
+          </a:effectRef>
+          <a:fontRef idx="minor">
+            <a:schemeClr val="lt1"/>
+          </a:fontRef>
+        </p:style>
+        <p:txBody>
+          <a:bodyPr rtlCol="0" anchor="ctr"/>
+          <a:lstStyle/>
+          <a:p>
+            <a:pPr algn="ctr"/>
+            <a:endParaRPr lang="en-US">
+              <a:latin typeface="Arial" panose="020B0604020202020204" pitchFamily="34" charset="0"/>
+              <a:cs typeface="Arial" panose="020B0604020202020204" pitchFamily="34" charset="0"/>
+            </a:endParaRPr>
+          </a:p>
+        </p:txBody>
+      </p:sp>
+      <p:sp>
+        <p:nvSpPr>
+          <p:cNvPr id="5" name="Rectangle 4">
+            <a:extLst>
+              <a:ext uri="{FF2B5EF4-FFF2-40B4-BE49-F238E27FC236}">
+                <a16:creationId xmlns:a16="http://schemas.microsoft.com/office/drawing/2014/main" id="{D7B3B870-1F00-4BCE-B580-A12C4F1B87D4}"/>
+              </a:ext>
+            </a:extLst>
+          </p:cNvPr>
+          <p:cNvSpPr/>
+          <p:nvPr/>
+        </p:nvSpPr>
+        <p:spPr>
+          <a:xfrm>
+            <a:off x="0" y="629162"/>
+            <a:ext cx="7315200" cy="4114800"/>
+          </a:xfrm>
+          <a:prstGeom prst="rect">
+            <a:avLst/>
+          </a:prstGeom>
+        </p:spPr>
+        <p:style>
+          <a:lnRef idx="2">
+            <a:schemeClr val="accent3">
+              <a:shade val="50000"/>
+            </a:schemeClr>
+          </a:lnRef>
+          <a:fillRef idx="1">
+            <a:schemeClr val="accent3"/>
+          </a:fillRef>
+          <a:effectRef idx="0">
+            <a:schemeClr val="accent3"/>
+          </a:effectRef>
+          <a:fontRef idx="minor">
+            <a:schemeClr val="lt1"/>
+          </a:fontRef>
+        </p:style>
+        <p:txBody>
+          <a:bodyPr rtlCol="0" anchor="ctr"/>
+          <a:lstStyle/>
+          <a:p>
+            <a:pPr algn="ctr"/>
+            <a:endParaRPr lang="en-US" dirty="0">
+              <a:solidFill>
+                <a:schemeClr val="accent2"/>
+              </a:solidFill>
+              <a:latin typeface="Arial" panose="020B0604020202020204" pitchFamily="34" charset="0"/>
+              <a:cs typeface="Arial" panose="020B0604020202020204" pitchFamily="34" charset="0"/>
+            </a:endParaRPr>
+          </a:p>
+        </p:txBody>
+      </p:sp>
+      <p:sp>
+        <p:nvSpPr>
+          <p:cNvPr id="20" name="Rectangle 19">
+            <a:extLst>
+              <a:ext uri="{FF2B5EF4-FFF2-40B4-BE49-F238E27FC236}">
+                <a16:creationId xmlns:a16="http://schemas.microsoft.com/office/drawing/2014/main" id="{44B3C268-0FD1-4AA2-A775-2C1F6C3D736C}"/>
+              </a:ext>
+            </a:extLst>
+          </p:cNvPr>
+          <p:cNvSpPr/>
+          <p:nvPr/>
+        </p:nvSpPr>
+        <p:spPr>
+          <a:xfrm>
+            <a:off x="0" y="1405780"/>
+            <a:ext cx="7315200" cy="2560320"/>
+          </a:xfrm>
+          <a:prstGeom prst="rect">
+            <a:avLst/>
+          </a:prstGeom>
+        </p:spPr>
+        <p:style>
+          <a:lnRef idx="2">
+            <a:schemeClr val="accent1">
+              <a:shade val="50000"/>
+            </a:schemeClr>
+          </a:lnRef>
+          <a:fillRef idx="1">
+            <a:schemeClr val="accent1"/>
+          </a:fillRef>
+          <a:effectRef idx="0">
+            <a:schemeClr val="accent1"/>
+          </a:effectRef>
+          <a:fontRef idx="minor">
+            <a:schemeClr val="lt1"/>
+          </a:fontRef>
+        </p:style>
+        <p:txBody>
+          <a:bodyPr rtlCol="0" anchor="ctr"/>
+          <a:lstStyle/>
+          <a:p>
+            <a:pPr algn="ctr"/>
+            <a:endParaRPr lang="en-US">
+              <a:latin typeface="Arial" panose="020B0604020202020204" pitchFamily="34" charset="0"/>
+              <a:cs typeface="Arial" panose="020B0604020202020204" pitchFamily="34" charset="0"/>
+            </a:endParaRPr>
+          </a:p>
+        </p:txBody>
+      </p:sp>
+      <p:pic>
+        <p:nvPicPr>
+          <p:cNvPr id="3" name="Picture 2" descr="A close up of a keyboard&#10;&#10;Description automatically generated">
+            <a:extLst>
+              <a:ext uri="{FF2B5EF4-FFF2-40B4-BE49-F238E27FC236}">
+                <a16:creationId xmlns:a16="http://schemas.microsoft.com/office/drawing/2014/main" id="{35046DA1-9A00-455E-9E05-4F60A1C8BDB4}"/>
+              </a:ext>
+            </a:extLst>
+          </p:cNvPr>
+          <p:cNvPicPr>
+            <a:picLocks noChangeAspect="1"/>
+          </p:cNvPicPr>
+          <p:nvPr/>
+        </p:nvPicPr>
+        <p:blipFill>
+          <a:blip r:embed="rId2">
+            <a:extLst>
+              <a:ext uri="{28A0092B-C50C-407E-A947-70E740481C1C}">
+                <a14:useLocalDpi xmlns:a14="http://schemas.microsoft.com/office/drawing/2010/main" val="0"/>
+              </a:ext>
+            </a:extLst>
+          </a:blip>
+          <a:stretch>
+            <a:fillRect/>
+          </a:stretch>
+        </p:blipFill>
+        <p:spPr>
+          <a:xfrm>
+            <a:off x="0" y="1405780"/>
+            <a:ext cx="1711036" cy="748578"/>
+          </a:xfrm>
+          <a:prstGeom prst="rect">
+            <a:avLst/>
+          </a:prstGeom>
+        </p:spPr>
+      </p:pic>
+    </p:spTree>
+    <p:extLst>
+      <p:ext uri="{BB962C8B-B14F-4D97-AF65-F5344CB8AC3E}">
+        <p14:creationId xmlns:p14="http://schemas.microsoft.com/office/powerpoint/2010/main" val="1166155303"/>
       </p:ext>
     </p:extLst>
   </p:cSld>
@@ -6905,17 +7347,17 @@
 <file path=customXml/itemProps3.xml><?xml version="1.0" encoding="utf-8"?>
 <ds:datastoreItem xmlns:ds="http://schemas.openxmlformats.org/officeDocument/2006/customXml" ds:itemID="{92329657-48FE-49A3-A424-7C5B871C3595}">
   <ds:schemaRefs>
+    <ds:schemaRef ds:uri="http://schemas.microsoft.com/office/2006/documentManagement/types"/>
+    <ds:schemaRef ds:uri="http://purl.org/dc/elements/1.1/"/>
+    <ds:schemaRef ds:uri="http://schemas.microsoft.com/office/2006/metadata/properties"/>
+    <ds:schemaRef ds:uri="http://schemas.microsoft.com/sharepoint/v3"/>
+    <ds:schemaRef ds:uri="http://schemas.microsoft.com/office/infopath/2007/PartnerControls"/>
+    <ds:schemaRef ds:uri="http://www.w3.org/XML/1998/namespace"/>
+    <ds:schemaRef ds:uri="216bde26-9634-4d6a-91fe-0c0c14b20b90"/>
+    <ds:schemaRef ds:uri="http://purl.org/dc/terms/"/>
     <ds:schemaRef ds:uri="http://schemas.openxmlformats.org/package/2006/metadata/core-properties"/>
+    <ds:schemaRef ds:uri="c8e4db4b-48df-4a0d-a5ad-b048e586ef36"/>
     <ds:schemaRef ds:uri="http://purl.org/dc/dcmitype/"/>
-    <ds:schemaRef ds:uri="http://www.w3.org/XML/1998/namespace"/>
-    <ds:schemaRef ds:uri="http://schemas.microsoft.com/office/infopath/2007/PartnerControls"/>
-    <ds:schemaRef ds:uri="http://purl.org/dc/elements/1.1/"/>
-    <ds:schemaRef ds:uri="c8e4db4b-48df-4a0d-a5ad-b048e586ef36"/>
-    <ds:schemaRef ds:uri="216bde26-9634-4d6a-91fe-0c0c14b20b90"/>
-    <ds:schemaRef ds:uri="http://schemas.microsoft.com/office/2006/documentManagement/types"/>
-    <ds:schemaRef ds:uri="http://schemas.microsoft.com/sharepoint/v3"/>
-    <ds:schemaRef ds:uri="http://schemas.microsoft.com/office/2006/metadata/properties"/>
-    <ds:schemaRef ds:uri="http://purl.org/dc/terms/"/>
   </ds:schemaRefs>
 </ds:datastoreItem>
 </file>
</xml_diff>